<commit_message>
Updated presentations for ECP
</commit_message>
<xml_diff>
--- a/summary-testing.pptx
+++ b/summary-testing.pptx
@@ -263,7 +263,7 @@
           <a:p>
             <a:fld id="{0B842F42-2CE9-4E35-95C1-410DC08A50B1}" type="datetimeFigureOut">
               <a:rPr lang="en-US" smtClean="0"/>
-              <a:t>4/17/2022</a:t>
+              <a:t>4/25/22</a:t>
             </a:fld>
             <a:endParaRPr lang="en-US"/>
           </a:p>
@@ -428,7 +428,7 @@
           <a:p>
             <a:fld id="{6F282904-F315-4730-8D91-37D99E141A6F}" type="datetimeFigureOut">
               <a:rPr lang="en-US" smtClean="0"/>
-              <a:t>4/17/2022</a:t>
+              <a:t>4/25/22</a:t>
             </a:fld>
             <a:endParaRPr lang="en-US"/>
           </a:p>
@@ -6743,8 +6743,8 @@
         </p:nvSpPr>
         <p:spPr>
           <a:xfrm>
-            <a:off x="365760" y="1163503"/>
-            <a:ext cx="11369809" cy="4047778"/>
+            <a:off x="365760" y="914400"/>
+            <a:ext cx="11369809" cy="5742431"/>
           </a:xfrm>
         </p:spPr>
         <p:txBody>
@@ -6773,9 +6773,21 @@
                 <a:solidFill>
                   <a:srgbClr val="333333"/>
                 </a:solidFill>
+                <a:highlight>
+                  <a:srgbClr val="FFFF00"/>
+                </a:highlight>
                 <a:latin typeface="Helvetica Neue"/>
               </a:rPr>
-              <a:t>Room 125 </a:t>
+              <a:t>Room ??</a:t>
+            </a:r>
+            <a:r>
+              <a:rPr lang="en-US" sz="1800" b="1" dirty="0">
+                <a:solidFill>
+                  <a:srgbClr val="333333"/>
+                </a:solidFill>
+                <a:latin typeface="Helvetica Neue"/>
+              </a:rPr>
+              <a:t> </a:t>
             </a:r>
             <a:r>
               <a:rPr lang="en-US" sz="1800" dirty="0">
@@ -6787,7 +6799,7 @@
               <a:t>in the </a:t>
             </a:r>
             <a:r>
-              <a:rPr lang="en-US" sz="1800" dirty="0" err="1">
+              <a:rPr lang="en-US" sz="1800" dirty="0">
                 <a:solidFill>
                   <a:srgbClr val="333333"/>
                 </a:solidFill>
@@ -6824,17 +6836,22 @@
                 <a:solidFill>
                   <a:srgbClr val="333333"/>
                 </a:solidFill>
+                <a:highlight>
+                  <a:srgbClr val="FFFF00"/>
+                </a:highlight>
                 <a:latin typeface="Helvetica Neue"/>
               </a:rPr>
-              <a:t>12:30pm-2:00pm Monday through Friday</a:t>
+              <a:t>hours? 12:30pm-2:00pm Monday through Friday</a:t>
             </a:r>
             <a:endParaRPr lang="en-US" sz="1800" b="0" i="0" dirty="0">
               <a:solidFill>
                 <a:srgbClr val="333333"/>
               </a:solidFill>
               <a:effectLst/>
+              <a:highlight>
+                <a:srgbClr val="FFFF00"/>
+              </a:highlight>
               <a:latin typeface="Helvetica Neue"/>
-              <a:hlinkClick r:id="rId3"/>
             </a:endParaRPr>
           </a:p>
           <a:p>
@@ -6847,29 +6864,7 @@
                 <a:latin typeface="Helvetica Neue"/>
                 <a:hlinkClick r:id="rId3"/>
               </a:rPr>
-              <a:t>Validation, Verification and Performance Suites, Proxy Apps, and Continuous Integration for </a:t>
-            </a:r>
-            <a:r>
-              <a:rPr lang="en-US" sz="2000" b="0" i="0" dirty="0" err="1">
-                <a:solidFill>
-                  <a:srgbClr val="333333"/>
-                </a:solidFill>
-                <a:effectLst/>
-                <a:latin typeface="Helvetica Neue"/>
-                <a:hlinkClick r:id="rId3"/>
-              </a:rPr>
-              <a:t>Exascale</a:t>
-            </a:r>
-            <a:r>
-              <a:rPr lang="en-US" sz="2000" b="0" i="0" dirty="0">
-                <a:solidFill>
-                  <a:srgbClr val="333333"/>
-                </a:solidFill>
-                <a:effectLst/>
-                <a:latin typeface="Helvetica Neue"/>
-                <a:hlinkClick r:id="rId3"/>
-              </a:rPr>
-              <a:t> Supercomputers</a:t>
+              <a:t>ECP Broader Engagement Initiative</a:t>
             </a:r>
             <a:endParaRPr lang="en-US" sz="2000" b="0" i="0" dirty="0">
               <a:solidFill>
@@ -6892,7 +6887,7 @@
                 </a:solidFill>
                 <a:latin typeface="Helvetica Neue"/>
               </a:rPr>
-              <a:t>10:00am-11:30am Wednesday </a:t>
+              <a:t>1:00pm-3:00pm Tuesday</a:t>
             </a:r>
           </a:p>
           <a:p>
@@ -6905,7 +6900,7 @@
                 <a:latin typeface="Helvetica Neue"/>
                 <a:hlinkClick r:id="rId4"/>
               </a:rPr>
-              <a:t>Advancing Scientific Productivity through Better Scientific Software</a:t>
+              <a:t>Programming Environments Landscape at ASCR Facilities</a:t>
             </a:r>
             <a:endParaRPr lang="en-US" sz="2000" b="0" i="0" dirty="0">
               <a:solidFill>
@@ -6928,26 +6923,24 @@
                 </a:solidFill>
                 <a:latin typeface="Helvetica Neue"/>
               </a:rPr>
-              <a:t>11:30am-12:30am Wednesday</a:t>
-            </a:r>
-          </a:p>
-          <a:p>
-            <a:r>
-              <a:rPr lang="en-US" sz="2000" b="0" i="0" dirty="0">
+              <a:t>2:00pm-3:00pm Tuesday</a:t>
+            </a:r>
+          </a:p>
+          <a:p>
+            <a:r>
+              <a:rPr lang="en-US" sz="2000" dirty="0">
                 <a:solidFill>
                   <a:srgbClr val="333333"/>
                 </a:solidFill>
-                <a:effectLst/>
                 <a:latin typeface="Helvetica Neue"/>
                 <a:hlinkClick r:id="rId5"/>
               </a:rPr>
-              <a:t>Hands-on with Progress Tracking Cards: A Lightweight Method for Improving Your Software Practices</a:t>
-            </a:r>
-            <a:endParaRPr lang="en-US" sz="2000" b="0" i="0" dirty="0">
+              <a:t>AD, Hardware and Integration, and Facilities Poster Session</a:t>
+            </a:r>
+            <a:endParaRPr lang="en-US" sz="2000" dirty="0">
               <a:solidFill>
                 <a:srgbClr val="333333"/>
               </a:solidFill>
-              <a:effectLst/>
               <a:latin typeface="Helvetica Neue"/>
             </a:endParaRPr>
           </a:p>
@@ -6964,26 +6957,44 @@
                 </a:solidFill>
                 <a:latin typeface="Helvetica Neue"/>
               </a:rPr>
-              <a:t>1:00pm-3:30pm Wednesday</a:t>
-            </a:r>
-          </a:p>
-          <a:p>
-            <a:r>
-              <a:rPr lang="en-US" sz="2000" b="0" i="0" dirty="0">
+              <a:t>4:00pm-6:00pm Tuesday</a:t>
+            </a:r>
+          </a:p>
+          <a:p>
+            <a:r>
+              <a:rPr lang="en-US" sz="2000" dirty="0">
                 <a:solidFill>
                   <a:srgbClr val="333333"/>
                 </a:solidFill>
-                <a:effectLst/>
                 <a:latin typeface="Helvetica Neue"/>
                 <a:hlinkClick r:id="rId6"/>
               </a:rPr>
-              <a:t>Benefiting from ECP CI</a:t>
-            </a:r>
-            <a:endParaRPr lang="en-US" sz="2000" b="0" i="0" dirty="0">
+              <a:t>Best Practices #</a:t>
+            </a:r>
+            <a:r>
+              <a:rPr lang="en-US" sz="2000" dirty="0" err="1">
+                <a:solidFill>
+                  <a:srgbClr val="333333"/>
+                </a:solidFill>
+                <a:latin typeface="Helvetica Neue"/>
+                <a:hlinkClick r:id="rId6"/>
+              </a:rPr>
+              <a:t>somycodewillseethefuture</a:t>
+            </a:r>
+            <a:r>
+              <a:rPr lang="en-US" sz="2000" dirty="0">
+                <a:solidFill>
+                  <a:srgbClr val="333333"/>
+                </a:solidFill>
+                <a:latin typeface="Helvetica Neue"/>
+                <a:hlinkClick r:id="rId6"/>
+              </a:rPr>
+              <a:t> Breakout</a:t>
+            </a:r>
+            <a:endParaRPr lang="en-US" sz="2000" dirty="0">
               <a:solidFill>
                 <a:srgbClr val="333333"/>
               </a:solidFill>
-              <a:effectLst/>
               <a:latin typeface="Helvetica Neue"/>
             </a:endParaRPr>
           </a:p>
@@ -7000,26 +7011,24 @@
                 </a:solidFill>
                 <a:latin typeface="Helvetica Neue"/>
               </a:rPr>
-              <a:t>2:30pm-3:30pm Wednesday</a:t>
-            </a:r>
-          </a:p>
-          <a:p>
-            <a:r>
-              <a:rPr lang="en-US" sz="2000" b="0" i="0" dirty="0">
+              <a:t>1:00pm-2:00pm Wednesday</a:t>
+            </a:r>
+          </a:p>
+          <a:p>
+            <a:r>
+              <a:rPr lang="en-US" sz="2000" dirty="0">
                 <a:solidFill>
                   <a:srgbClr val="333333"/>
                 </a:solidFill>
-                <a:effectLst/>
                 <a:latin typeface="Helvetica Neue"/>
                 <a:hlinkClick r:id="rId7"/>
               </a:rPr>
-              <a:t>ECP CI Startup Tutorial</a:t>
-            </a:r>
-            <a:endParaRPr lang="en-US" sz="2000" b="0" i="0" dirty="0">
+              <a:t>Panel on Sustainability of ECP Software and Applications</a:t>
+            </a:r>
+            <a:endParaRPr lang="en-US" sz="2000" dirty="0">
               <a:solidFill>
                 <a:srgbClr val="333333"/>
               </a:solidFill>
-              <a:effectLst/>
               <a:latin typeface="Helvetica Neue"/>
             </a:endParaRPr>
           </a:p>
@@ -7036,55 +7045,101 @@
                 </a:solidFill>
                 <a:latin typeface="Helvetica Neue"/>
               </a:rPr>
-              <a:t>2:30pm-6:00pm Friday</a:t>
-            </a:r>
-            <a:endParaRPr lang="en-US" sz="1800" dirty="0"/>
-          </a:p>
-        </p:txBody>
-      </p:sp>
-      <p:sp>
-        <p:nvSpPr>
-          <p:cNvPr id="4" name="TextBox 3">
-            <a:extLst>
-              <a:ext uri="{FF2B5EF4-FFF2-40B4-BE49-F238E27FC236}">
-                <a16:creationId xmlns:a16="http://schemas.microsoft.com/office/drawing/2014/main" id="{4D54825D-53F9-47A0-A084-AB1A539D10ED}"/>
-              </a:ext>
-            </a:extLst>
-          </p:cNvPr>
-          <p:cNvSpPr txBox="1"/>
-          <p:nvPr/>
-        </p:nvSpPr>
-        <p:spPr>
-          <a:xfrm rot="19800000">
-            <a:off x="1391118" y="2817578"/>
-            <a:ext cx="8806513" cy="1181862"/>
-          </a:xfrm>
-          <a:prstGeom prst="rect">
-            <a:avLst/>
-          </a:prstGeom>
-          <a:noFill/>
-        </p:spPr>
-        <p:txBody>
-          <a:bodyPr wrap="none" lIns="118872" tIns="91440" rIns="118872" bIns="91440" rtlCol="0" anchor="ctr" anchorCtr="0">
-            <a:spAutoFit/>
-          </a:bodyPr>
-          <a:lstStyle/>
-          <a:p>
-            <a:pPr algn="l">
-              <a:lnSpc>
-                <a:spcPct val="90000"/>
-              </a:lnSpc>
+              <a:t>1:00pm-3:00pm Wednesday</a:t>
+            </a:r>
+          </a:p>
+          <a:p>
+            <a:r>
+              <a:rPr lang="en-US" sz="2000" dirty="0">
+                <a:solidFill>
+                  <a:srgbClr val="333333"/>
+                </a:solidFill>
+                <a:latin typeface="Helvetica Neue"/>
+                <a:hlinkClick r:id="rId8"/>
+              </a:rPr>
+              <a:t>What Can be Learned from Applying Team of Teams Principles to the ECP Projects </a:t>
+            </a:r>
+            <a:r>
+              <a:rPr lang="en-US" sz="2000" dirty="0" err="1">
+                <a:solidFill>
+                  <a:srgbClr val="333333"/>
+                </a:solidFill>
+                <a:latin typeface="Helvetica Neue"/>
+                <a:hlinkClick r:id="rId8"/>
+              </a:rPr>
+              <a:t>PETSc</a:t>
+            </a:r>
+            <a:r>
+              <a:rPr lang="en-US" sz="2000" dirty="0">
+                <a:solidFill>
+                  <a:srgbClr val="333333"/>
+                </a:solidFill>
+                <a:latin typeface="Helvetica Neue"/>
+                <a:hlinkClick r:id="rId8"/>
+              </a:rPr>
+              <a:t>, </a:t>
+            </a:r>
+            <a:r>
+              <a:rPr lang="en-US" sz="2000" dirty="0" err="1">
+                <a:solidFill>
+                  <a:srgbClr val="333333"/>
+                </a:solidFill>
+                <a:latin typeface="Helvetica Neue"/>
+                <a:hlinkClick r:id="rId8"/>
+              </a:rPr>
+              <a:t>Trilinos</a:t>
+            </a:r>
+            <a:r>
+              <a:rPr lang="en-US" sz="2000" dirty="0">
+                <a:solidFill>
+                  <a:srgbClr val="333333"/>
+                </a:solidFill>
+                <a:latin typeface="Helvetica Neue"/>
+                <a:hlinkClick r:id="rId8"/>
+              </a:rPr>
+              <a:t>, </a:t>
+            </a:r>
+            <a:r>
+              <a:rPr lang="en-US" sz="2000" dirty="0" err="1">
+                <a:solidFill>
+                  <a:srgbClr val="333333"/>
+                </a:solidFill>
+                <a:latin typeface="Helvetica Neue"/>
+                <a:hlinkClick r:id="rId8"/>
+              </a:rPr>
+              <a:t>xSDK</a:t>
+            </a:r>
+            <a:r>
+              <a:rPr lang="en-US" sz="2000" dirty="0">
+                <a:solidFill>
+                  <a:srgbClr val="333333"/>
+                </a:solidFill>
+                <a:latin typeface="Helvetica Neue"/>
+                <a:hlinkClick r:id="rId8"/>
+              </a:rPr>
+              <a:t>, and E4S?</a:t>
+            </a:r>
+            <a:endParaRPr lang="en-US" sz="2000" dirty="0">
+              <a:solidFill>
+                <a:srgbClr val="333333"/>
+              </a:solidFill>
+              <a:latin typeface="Helvetica Neue"/>
+            </a:endParaRPr>
+          </a:p>
+          <a:p>
+            <a:pPr lvl="1">
+              <a:spcBef>
+                <a:spcPts val="200"/>
+              </a:spcBef>
             </a:pPr>
             <a:r>
-              <a:rPr lang="en-US" sz="7200" dirty="0">
-                <a:solidFill>
-                  <a:srgbClr val="FF0000"/>
-                </a:solidFill>
-                <a:highlight>
-                  <a:srgbClr val="FFFF00"/>
-                </a:highlight>
+              <a:rPr lang="en-US" sz="1800" dirty="0">
+                <a:solidFill>
+                  <a:srgbClr val="333333"/>
+                </a:solidFill>
+                <a:latin typeface="Helvetica Neue"/>
               </a:rPr>
-              <a:t>Needs to be updated</a:t>
+              <a:t>1:00pm-3:00pm Thursday</a:t>
             </a:r>
           </a:p>
         </p:txBody>
@@ -8015,6 +8070,12 @@
 </file>
 
 <file path=customXml/item1.xml><?xml version="1.0" encoding="utf-8"?>
+<p:properties xmlns:p="http://schemas.microsoft.com/office/2006/metadata/properties" xmlns:xsi="http://www.w3.org/2001/XMLSchema-instance" xmlns:pc="http://schemas.microsoft.com/office/infopath/2007/PartnerControls">
+  <documentManagement/>
+</p:properties>
+</file>
+
+<file path=customXml/item2.xml><?xml version="1.0" encoding="utf-8"?>
 <ct:contentTypeSchema xmlns:ct="http://schemas.microsoft.com/office/2006/metadata/contentType" xmlns:ma="http://schemas.microsoft.com/office/2006/metadata/properties/metaAttributes" ct:_="" ma:_="" ma:contentTypeName="Document" ma:contentTypeID="0x010100565464437F680748A68B85EB6594EA7D" ma:contentTypeVersion="0" ma:contentTypeDescription="Create a new document." ma:contentTypeScope="" ma:versionID="fe3f4dd58d5914c51cfc6deaa8ad845c">
   <xsd:schema xmlns:xsd="http://www.w3.org/2001/XMLSchema" xmlns:p="http://schemas.microsoft.com/office/2006/metadata/properties" targetNamespace="http://schemas.microsoft.com/office/2006/metadata/properties" ma:root="true" ma:fieldsID="4aeb20c0e3442673af7ee10786458764">
     <xsd:element name="properties">
@@ -8063,12 +8124,6 @@
 </ct:contentTypeSchema>
 </file>
 
-<file path=customXml/item2.xml><?xml version="1.0" encoding="utf-8"?>
-<p:properties xmlns:p="http://schemas.microsoft.com/office/2006/metadata/properties" xmlns:xsi="http://www.w3.org/2001/XMLSchema-instance" xmlns:pc="http://schemas.microsoft.com/office/infopath/2007/PartnerControls">
-  <documentManagement/>
-</p:properties>
-</file>
-
 <file path=customXml/item3.xml><?xml version="1.0" encoding="utf-8"?>
 <?mso-contentType ?>
 <FormTemplates xmlns="http://schemas.microsoft.com/sharepoint/v3/contenttype/forms">
@@ -8079,6 +8134,21 @@
 </file>
 
 <file path=customXml/itemProps1.xml><?xml version="1.0" encoding="utf-8"?>
+<ds:datastoreItem xmlns:ds="http://schemas.openxmlformats.org/officeDocument/2006/customXml" ds:itemID="{A50EC660-24D0-43A0-AE5E-E274115E726B}">
+  <ds:schemaRefs>
+    <ds:schemaRef ds:uri="http://purl.org/dc/elements/1.1/"/>
+    <ds:schemaRef ds:uri="http://schemas.microsoft.com/office/2006/metadata/properties"/>
+    <ds:schemaRef ds:uri="http://purl.org/dc/terms/"/>
+    <ds:schemaRef ds:uri="http://schemas.openxmlformats.org/package/2006/metadata/core-properties"/>
+    <ds:schemaRef ds:uri="http://schemas.microsoft.com/office/2006/documentManagement/types"/>
+    <ds:schemaRef ds:uri="http://www.w3.org/XML/1998/namespace"/>
+    <ds:schemaRef ds:uri="http://purl.org/dc/dcmitype/"/>
+    <ds:schemaRef ds:uri="http://schemas.microsoft.com/office/infopath/2007/PartnerControls"/>
+  </ds:schemaRefs>
+</ds:datastoreItem>
+</file>
+
+<file path=customXml/itemProps2.xml><?xml version="1.0" encoding="utf-8"?>
 <ds:datastoreItem xmlns:ds="http://schemas.openxmlformats.org/officeDocument/2006/customXml" ds:itemID="{E8DB7DEB-074E-4EE8-9B6E-FD277323109C}">
   <ds:schemaRefs>
     <ds:schemaRef ds:uri="http://schemas.microsoft.com/office/2006/metadata/contentType"/>
@@ -8093,21 +8163,6 @@
 </ds:datastoreItem>
 </file>
 
-<file path=customXml/itemProps2.xml><?xml version="1.0" encoding="utf-8"?>
-<ds:datastoreItem xmlns:ds="http://schemas.openxmlformats.org/officeDocument/2006/customXml" ds:itemID="{A50EC660-24D0-43A0-AE5E-E274115E726B}">
-  <ds:schemaRefs>
-    <ds:schemaRef ds:uri="http://purl.org/dc/elements/1.1/"/>
-    <ds:schemaRef ds:uri="http://schemas.microsoft.com/office/2006/metadata/properties"/>
-    <ds:schemaRef ds:uri="http://purl.org/dc/terms/"/>
-    <ds:schemaRef ds:uri="http://schemas.openxmlformats.org/package/2006/metadata/core-properties"/>
-    <ds:schemaRef ds:uri="http://schemas.microsoft.com/office/2006/documentManagement/types"/>
-    <ds:schemaRef ds:uri="http://www.w3.org/XML/1998/namespace"/>
-    <ds:schemaRef ds:uri="http://purl.org/dc/dcmitype/"/>
-    <ds:schemaRef ds:uri="http://schemas.microsoft.com/office/infopath/2007/PartnerControls"/>
-  </ds:schemaRefs>
-</ds:datastoreItem>
-</file>
-
 <file path=customXml/itemProps3.xml><?xml version="1.0" encoding="utf-8"?>
 <ds:datastoreItem xmlns:ds="http://schemas.openxmlformats.org/officeDocument/2006/customXml" ds:itemID="{19E20559-B232-4371-8690-E3D8007EDB82}">
   <ds:schemaRefs>

</xml_diff>

<commit_message>
Updated links in summary-testing.
</commit_message>
<xml_diff>
--- a/summary-testing.pptx
+++ b/summary-testing.pptx
@@ -263,7 +263,7 @@
           <a:p>
             <a:fld id="{0B842F42-2CE9-4E35-95C1-410DC08A50B1}" type="datetimeFigureOut">
               <a:rPr lang="en-US" smtClean="0"/>
-              <a:t>4/25/22</a:t>
+              <a:t>4/28/22</a:t>
             </a:fld>
             <a:endParaRPr lang="en-US"/>
           </a:p>
@@ -428,7 +428,7 @@
           <a:p>
             <a:fld id="{6F282904-F315-4730-8D91-37D99E141A6F}" type="datetimeFigureOut">
               <a:rPr lang="en-US" smtClean="0"/>
-              <a:t>4/25/22</a:t>
+              <a:t>4/28/22</a:t>
             </a:fld>
             <a:endParaRPr lang="en-US"/>
           </a:p>
@@ -6773,21 +6773,9 @@
                 <a:solidFill>
                   <a:srgbClr val="333333"/>
                 </a:solidFill>
-                <a:highlight>
-                  <a:srgbClr val="FFFF00"/>
-                </a:highlight>
                 <a:latin typeface="Helvetica Neue"/>
               </a:rPr>
-              <a:t>Room ??</a:t>
-            </a:r>
-            <a:r>
-              <a:rPr lang="en-US" sz="1800" b="1" dirty="0">
-                <a:solidFill>
-                  <a:srgbClr val="333333"/>
-                </a:solidFill>
-                <a:latin typeface="Helvetica Neue"/>
-              </a:rPr>
-              <a:t> </a:t>
+              <a:t>Room 125 </a:t>
             </a:r>
             <a:r>
               <a:rPr lang="en-US" sz="1800" dirty="0">
@@ -6815,7 +6803,34 @@
                 </a:solidFill>
                 <a:latin typeface="Helvetica Neue"/>
               </a:rPr>
-              <a:t> Side Meetings area</a:t>
+              <a:t> Side Meetings area (</a:t>
+            </a:r>
+            <a:r>
+              <a:rPr lang="en-US" sz="1800" dirty="0" err="1">
+                <a:solidFill>
+                  <a:srgbClr val="333333"/>
+                </a:solidFill>
+                <a:latin typeface="Helvetica Neue"/>
+              </a:rPr>
+              <a:t>Whova</a:t>
+            </a:r>
+            <a:r>
+              <a:rPr lang="en-US" sz="1800">
+                <a:solidFill>
+                  <a:srgbClr val="333333"/>
+                </a:solidFill>
+                <a:latin typeface="Helvetica Neue"/>
+              </a:rPr>
+              <a:t> -&gt; </a:t>
+            </a:r>
+            <a:r>
+              <a:rPr lang="en-US" sz="1800" dirty="0">
+                <a:solidFill>
+                  <a:srgbClr val="333333"/>
+                </a:solidFill>
+                <a:latin typeface="Helvetica Neue"/>
+              </a:rPr>
+              <a:t>Logistics)</a:t>
             </a:r>
             <a:endParaRPr lang="en-US" sz="1800" b="0" i="0" dirty="0">
               <a:solidFill>
@@ -6836,21 +6851,15 @@
                 <a:solidFill>
                   <a:srgbClr val="333333"/>
                 </a:solidFill>
-                <a:highlight>
-                  <a:srgbClr val="FFFF00"/>
-                </a:highlight>
                 <a:latin typeface="Helvetica Neue"/>
               </a:rPr>
-              <a:t>hours? 12:30pm-2:00pm Monday through Friday</a:t>
+              <a:t>Hours: 12:30pm-1:30pm Monday through Friday</a:t>
             </a:r>
             <a:endParaRPr lang="en-US" sz="1800" b="0" i="0" dirty="0">
               <a:solidFill>
                 <a:srgbClr val="333333"/>
               </a:solidFill>
               <a:effectLst/>
-              <a:highlight>
-                <a:srgbClr val="FFFF00"/>
-              </a:highlight>
               <a:latin typeface="Helvetica Neue"/>
             </a:endParaRPr>
           </a:p>
@@ -8070,12 +8079,21 @@
 </file>
 
 <file path=customXml/item1.xml><?xml version="1.0" encoding="utf-8"?>
+<?mso-contentType ?>
+<FormTemplates xmlns="http://schemas.microsoft.com/sharepoint/v3/contenttype/forms">
+  <Display>DocumentLibraryForm</Display>
+  <Edit>DocumentLibraryForm</Edit>
+  <New>DocumentLibraryForm</New>
+</FormTemplates>
+</file>
+
+<file path=customXml/item2.xml><?xml version="1.0" encoding="utf-8"?>
 <p:properties xmlns:p="http://schemas.microsoft.com/office/2006/metadata/properties" xmlns:xsi="http://www.w3.org/2001/XMLSchema-instance" xmlns:pc="http://schemas.microsoft.com/office/infopath/2007/PartnerControls">
   <documentManagement/>
 </p:properties>
 </file>
 
-<file path=customXml/item2.xml><?xml version="1.0" encoding="utf-8"?>
+<file path=customXml/item3.xml><?xml version="1.0" encoding="utf-8"?>
 <ct:contentTypeSchema xmlns:ct="http://schemas.microsoft.com/office/2006/metadata/contentType" xmlns:ma="http://schemas.microsoft.com/office/2006/metadata/properties/metaAttributes" ct:_="" ma:_="" ma:contentTypeName="Document" ma:contentTypeID="0x010100565464437F680748A68B85EB6594EA7D" ma:contentTypeVersion="0" ma:contentTypeDescription="Create a new document." ma:contentTypeScope="" ma:versionID="fe3f4dd58d5914c51cfc6deaa8ad845c">
   <xsd:schema xmlns:xsd="http://www.w3.org/2001/XMLSchema" xmlns:p="http://schemas.microsoft.com/office/2006/metadata/properties" targetNamespace="http://schemas.microsoft.com/office/2006/metadata/properties" ma:root="true" ma:fieldsID="4aeb20c0e3442673af7ee10786458764">
     <xsd:element name="properties">
@@ -8124,16 +8142,15 @@
 </ct:contentTypeSchema>
 </file>
 
-<file path=customXml/item3.xml><?xml version="1.0" encoding="utf-8"?>
-<?mso-contentType ?>
-<FormTemplates xmlns="http://schemas.microsoft.com/sharepoint/v3/contenttype/forms">
-  <Display>DocumentLibraryForm</Display>
-  <Edit>DocumentLibraryForm</Edit>
-  <New>DocumentLibraryForm</New>
-</FormTemplates>
+<file path=customXml/itemProps1.xml><?xml version="1.0" encoding="utf-8"?>
+<ds:datastoreItem xmlns:ds="http://schemas.openxmlformats.org/officeDocument/2006/customXml" ds:itemID="{19E20559-B232-4371-8690-E3D8007EDB82}">
+  <ds:schemaRefs>
+    <ds:schemaRef ds:uri="http://schemas.microsoft.com/sharepoint/v3/contenttype/forms"/>
+  </ds:schemaRefs>
+</ds:datastoreItem>
 </file>
 
-<file path=customXml/itemProps1.xml><?xml version="1.0" encoding="utf-8"?>
+<file path=customXml/itemProps2.xml><?xml version="1.0" encoding="utf-8"?>
 <ds:datastoreItem xmlns:ds="http://schemas.openxmlformats.org/officeDocument/2006/customXml" ds:itemID="{A50EC660-24D0-43A0-AE5E-E274115E726B}">
   <ds:schemaRefs>
     <ds:schemaRef ds:uri="http://purl.org/dc/elements/1.1/"/>
@@ -8148,7 +8165,7 @@
 </ds:datastoreItem>
 </file>
 
-<file path=customXml/itemProps2.xml><?xml version="1.0" encoding="utf-8"?>
+<file path=customXml/itemProps3.xml><?xml version="1.0" encoding="utf-8"?>
 <ds:datastoreItem xmlns:ds="http://schemas.openxmlformats.org/officeDocument/2006/customXml" ds:itemID="{E8DB7DEB-074E-4EE8-9B6E-FD277323109C}">
   <ds:schemaRefs>
     <ds:schemaRef ds:uri="http://schemas.microsoft.com/office/2006/metadata/contentType"/>
@@ -8161,12 +8178,4 @@
     <ds:schemaRef ds:uri="http://schemas.microsoft.com/office/internal/2005/internalDocumentation"/>
   </ds:schemaRefs>
 </ds:datastoreItem>
-</file>
-
-<file path=customXml/itemProps3.xml><?xml version="1.0" encoding="utf-8"?>
-<ds:datastoreItem xmlns:ds="http://schemas.openxmlformats.org/officeDocument/2006/customXml" ds:itemID="{19E20559-B232-4371-8690-E3D8007EDB82}">
-  <ds:schemaRefs>
-    <ds:schemaRef ds:uri="http://schemas.microsoft.com/sharepoint/v3/contenttype/forms"/>
-  </ds:schemaRefs>
-</ds:datastoreItem>
 </file>
</xml_diff>

<commit_message>
Removed one event from the list of related events
The Programming Environment session has nothing to do with IDEAS
</commit_message>
<xml_diff>
--- a/summary-testing.pptx
+++ b/summary-testing.pptx
@@ -263,7 +263,7 @@
           <a:p>
             <a:fld id="{0B842F42-2CE9-4E35-95C1-410DC08A50B1}" type="datetimeFigureOut">
               <a:rPr lang="en-US" smtClean="0"/>
-              <a:t>4/28/22</a:t>
+              <a:t>4/28/2022</a:t>
             </a:fld>
             <a:endParaRPr lang="en-US"/>
           </a:p>
@@ -428,7 +428,7 @@
           <a:p>
             <a:fld id="{6F282904-F315-4730-8D91-37D99E141A6F}" type="datetimeFigureOut">
               <a:rPr lang="en-US" smtClean="0"/>
-              <a:t>4/28/22</a:t>
+              <a:t>4/28/2022</a:t>
             </a:fld>
             <a:endParaRPr lang="en-US"/>
           </a:p>
@@ -6815,22 +6815,13 @@
               <a:t>Whova</a:t>
             </a:r>
             <a:r>
-              <a:rPr lang="en-US" sz="1800">
+              <a:rPr lang="en-US" sz="1800" dirty="0">
                 <a:solidFill>
                   <a:srgbClr val="333333"/>
                 </a:solidFill>
                 <a:latin typeface="Helvetica Neue"/>
               </a:rPr>
-              <a:t> -&gt; </a:t>
-            </a:r>
-            <a:r>
-              <a:rPr lang="en-US" sz="1800" dirty="0">
-                <a:solidFill>
-                  <a:srgbClr val="333333"/>
-                </a:solidFill>
-                <a:latin typeface="Helvetica Neue"/>
-              </a:rPr>
-              <a:t>Logistics)</a:t>
+              <a:t> -&gt; Logistics)</a:t>
             </a:r>
             <a:endParaRPr lang="en-US" sz="1800" b="0" i="0" dirty="0">
               <a:solidFill>
@@ -6901,50 +6892,24 @@
           </a:p>
           <a:p>
             <a:r>
-              <a:rPr lang="en-US" sz="2000" b="0" i="0" dirty="0">
+              <a:rPr lang="en-US" sz="2000">
                 <a:solidFill>
                   <a:srgbClr val="333333"/>
                 </a:solidFill>
-                <a:effectLst/>
                 <a:latin typeface="Helvetica Neue"/>
                 <a:hlinkClick r:id="rId4"/>
               </a:rPr>
-              <a:t>Programming Environments Landscape at ASCR Facilities</a:t>
-            </a:r>
-            <a:endParaRPr lang="en-US" sz="2000" b="0" i="0" dirty="0">
-              <a:solidFill>
-                <a:srgbClr val="333333"/>
-              </a:solidFill>
-              <a:effectLst/>
-              <a:latin typeface="Helvetica Neue"/>
-            </a:endParaRPr>
-          </a:p>
-          <a:p>
-            <a:pPr lvl="1">
-              <a:spcBef>
-                <a:spcPts val="200"/>
-              </a:spcBef>
-            </a:pPr>
-            <a:r>
-              <a:rPr lang="en-US" sz="1800" dirty="0">
+              <a:t>AD</a:t>
+            </a:r>
+            <a:r>
+              <a:rPr lang="en-US" sz="2000" dirty="0">
                 <a:solidFill>
                   <a:srgbClr val="333333"/>
                 </a:solidFill>
                 <a:latin typeface="Helvetica Neue"/>
+                <a:hlinkClick r:id="rId4"/>
               </a:rPr>
-              <a:t>2:00pm-3:00pm Tuesday</a:t>
-            </a:r>
-          </a:p>
-          <a:p>
-            <a:r>
-              <a:rPr lang="en-US" sz="2000" dirty="0">
-                <a:solidFill>
-                  <a:srgbClr val="333333"/>
-                </a:solidFill>
-                <a:latin typeface="Helvetica Neue"/>
-                <a:hlinkClick r:id="rId5"/>
-              </a:rPr>
-              <a:t>AD, Hardware and Integration, and Facilities Poster Session</a:t>
+              <a:t>, Hardware and Integration, and Facilities Poster Session</a:t>
             </a:r>
             <a:endParaRPr lang="en-US" sz="2000" dirty="0">
               <a:solidFill>
@@ -6976,7 +6941,7 @@
                   <a:srgbClr val="333333"/>
                 </a:solidFill>
                 <a:latin typeface="Helvetica Neue"/>
-                <a:hlinkClick r:id="rId6"/>
+                <a:hlinkClick r:id="rId5"/>
               </a:rPr>
               <a:t>Best Practices #</a:t>
             </a:r>
@@ -6986,7 +6951,7 @@
                   <a:srgbClr val="333333"/>
                 </a:solidFill>
                 <a:latin typeface="Helvetica Neue"/>
-                <a:hlinkClick r:id="rId6"/>
+                <a:hlinkClick r:id="rId5"/>
               </a:rPr>
               <a:t>somycodewillseethefuture</a:t>
             </a:r>
@@ -6996,7 +6961,7 @@
                   <a:srgbClr val="333333"/>
                 </a:solidFill>
                 <a:latin typeface="Helvetica Neue"/>
-                <a:hlinkClick r:id="rId6"/>
+                <a:hlinkClick r:id="rId5"/>
               </a:rPr>
               <a:t> Breakout</a:t>
             </a:r>
@@ -7030,7 +6995,7 @@
                   <a:srgbClr val="333333"/>
                 </a:solidFill>
                 <a:latin typeface="Helvetica Neue"/>
-                <a:hlinkClick r:id="rId7"/>
+                <a:hlinkClick r:id="rId6"/>
               </a:rPr>
               <a:t>Panel on Sustainability of ECP Software and Applications</a:t>
             </a:r>
@@ -7064,7 +7029,7 @@
                   <a:srgbClr val="333333"/>
                 </a:solidFill>
                 <a:latin typeface="Helvetica Neue"/>
-                <a:hlinkClick r:id="rId8"/>
+                <a:hlinkClick r:id="rId7"/>
               </a:rPr>
               <a:t>What Can be Learned from Applying Team of Teams Principles to the ECP Projects </a:t>
             </a:r>
@@ -7074,7 +7039,7 @@
                   <a:srgbClr val="333333"/>
                 </a:solidFill>
                 <a:latin typeface="Helvetica Neue"/>
-                <a:hlinkClick r:id="rId8"/>
+                <a:hlinkClick r:id="rId7"/>
               </a:rPr>
               <a:t>PETSc</a:t>
             </a:r>
@@ -7084,7 +7049,7 @@
                   <a:srgbClr val="333333"/>
                 </a:solidFill>
                 <a:latin typeface="Helvetica Neue"/>
-                <a:hlinkClick r:id="rId8"/>
+                <a:hlinkClick r:id="rId7"/>
               </a:rPr>
               <a:t>, </a:t>
             </a:r>
@@ -7094,7 +7059,7 @@
                   <a:srgbClr val="333333"/>
                 </a:solidFill>
                 <a:latin typeface="Helvetica Neue"/>
-                <a:hlinkClick r:id="rId8"/>
+                <a:hlinkClick r:id="rId7"/>
               </a:rPr>
               <a:t>Trilinos</a:t>
             </a:r>
@@ -7104,7 +7069,7 @@
                   <a:srgbClr val="333333"/>
                 </a:solidFill>
                 <a:latin typeface="Helvetica Neue"/>
-                <a:hlinkClick r:id="rId8"/>
+                <a:hlinkClick r:id="rId7"/>
               </a:rPr>
               <a:t>, </a:t>
             </a:r>
@@ -7114,7 +7079,7 @@
                   <a:srgbClr val="333333"/>
                 </a:solidFill>
                 <a:latin typeface="Helvetica Neue"/>
-                <a:hlinkClick r:id="rId8"/>
+                <a:hlinkClick r:id="rId7"/>
               </a:rPr>
               <a:t>xSDK</a:t>
             </a:r>
@@ -7124,7 +7089,7 @@
                   <a:srgbClr val="333333"/>
                 </a:solidFill>
                 <a:latin typeface="Helvetica Neue"/>
-                <a:hlinkClick r:id="rId8"/>
+                <a:hlinkClick r:id="rId7"/>
               </a:rPr>
               <a:t>, and E4S?</a:t>
             </a:r>
@@ -8079,21 +8044,6 @@
 </file>
 
 <file path=customXml/item1.xml><?xml version="1.0" encoding="utf-8"?>
-<?mso-contentType ?>
-<FormTemplates xmlns="http://schemas.microsoft.com/sharepoint/v3/contenttype/forms">
-  <Display>DocumentLibraryForm</Display>
-  <Edit>DocumentLibraryForm</Edit>
-  <New>DocumentLibraryForm</New>
-</FormTemplates>
-</file>
-
-<file path=customXml/item2.xml><?xml version="1.0" encoding="utf-8"?>
-<p:properties xmlns:p="http://schemas.microsoft.com/office/2006/metadata/properties" xmlns:xsi="http://www.w3.org/2001/XMLSchema-instance" xmlns:pc="http://schemas.microsoft.com/office/infopath/2007/PartnerControls">
-  <documentManagement/>
-</p:properties>
-</file>
-
-<file path=customXml/item3.xml><?xml version="1.0" encoding="utf-8"?>
 <ct:contentTypeSchema xmlns:ct="http://schemas.microsoft.com/office/2006/metadata/contentType" xmlns:ma="http://schemas.microsoft.com/office/2006/metadata/properties/metaAttributes" ct:_="" ma:_="" ma:contentTypeName="Document" ma:contentTypeID="0x010100565464437F680748A68B85EB6594EA7D" ma:contentTypeVersion="0" ma:contentTypeDescription="Create a new document." ma:contentTypeScope="" ma:versionID="fe3f4dd58d5914c51cfc6deaa8ad845c">
   <xsd:schema xmlns:xsd="http://www.w3.org/2001/XMLSchema" xmlns:p="http://schemas.microsoft.com/office/2006/metadata/properties" targetNamespace="http://schemas.microsoft.com/office/2006/metadata/properties" ma:root="true" ma:fieldsID="4aeb20c0e3442673af7ee10786458764">
     <xsd:element name="properties">
@@ -8142,10 +8092,32 @@
 </ct:contentTypeSchema>
 </file>
 
+<file path=customXml/item2.xml><?xml version="1.0" encoding="utf-8"?>
+<p:properties xmlns:p="http://schemas.microsoft.com/office/2006/metadata/properties" xmlns:xsi="http://www.w3.org/2001/XMLSchema-instance" xmlns:pc="http://schemas.microsoft.com/office/infopath/2007/PartnerControls">
+  <documentManagement/>
+</p:properties>
+</file>
+
+<file path=customXml/item3.xml><?xml version="1.0" encoding="utf-8"?>
+<?mso-contentType ?>
+<FormTemplates xmlns="http://schemas.microsoft.com/sharepoint/v3/contenttype/forms">
+  <Display>DocumentLibraryForm</Display>
+  <Edit>DocumentLibraryForm</Edit>
+  <New>DocumentLibraryForm</New>
+</FormTemplates>
+</file>
+
 <file path=customXml/itemProps1.xml><?xml version="1.0" encoding="utf-8"?>
-<ds:datastoreItem xmlns:ds="http://schemas.openxmlformats.org/officeDocument/2006/customXml" ds:itemID="{19E20559-B232-4371-8690-E3D8007EDB82}">
+<ds:datastoreItem xmlns:ds="http://schemas.openxmlformats.org/officeDocument/2006/customXml" ds:itemID="{E8DB7DEB-074E-4EE8-9B6E-FD277323109C}">
   <ds:schemaRefs>
-    <ds:schemaRef ds:uri="http://schemas.microsoft.com/sharepoint/v3/contenttype/forms"/>
+    <ds:schemaRef ds:uri="http://schemas.microsoft.com/office/2006/metadata/contentType"/>
+    <ds:schemaRef ds:uri="http://schemas.microsoft.com/office/2006/metadata/properties/metaAttributes"/>
+    <ds:schemaRef ds:uri="http://www.w3.org/2001/XMLSchema"/>
+    <ds:schemaRef ds:uri="http://schemas.microsoft.com/office/2006/metadata/properties"/>
+    <ds:schemaRef ds:uri="http://schemas.openxmlformats.org/package/2006/metadata/core-properties"/>
+    <ds:schemaRef ds:uri="http://purl.org/dc/elements/1.1/"/>
+    <ds:schemaRef ds:uri="http://purl.org/dc/terms/"/>
+    <ds:schemaRef ds:uri="http://schemas.microsoft.com/office/internal/2005/internalDocumentation"/>
   </ds:schemaRefs>
 </ds:datastoreItem>
 </file>
@@ -8166,16 +8138,9 @@
 </file>
 
 <file path=customXml/itemProps3.xml><?xml version="1.0" encoding="utf-8"?>
-<ds:datastoreItem xmlns:ds="http://schemas.openxmlformats.org/officeDocument/2006/customXml" ds:itemID="{E8DB7DEB-074E-4EE8-9B6E-FD277323109C}">
+<ds:datastoreItem xmlns:ds="http://schemas.openxmlformats.org/officeDocument/2006/customXml" ds:itemID="{19E20559-B232-4371-8690-E3D8007EDB82}">
   <ds:schemaRefs>
-    <ds:schemaRef ds:uri="http://schemas.microsoft.com/office/2006/metadata/contentType"/>
-    <ds:schemaRef ds:uri="http://schemas.microsoft.com/office/2006/metadata/properties/metaAttributes"/>
-    <ds:schemaRef ds:uri="http://www.w3.org/2001/XMLSchema"/>
-    <ds:schemaRef ds:uri="http://schemas.microsoft.com/office/2006/metadata/properties"/>
-    <ds:schemaRef ds:uri="http://schemas.openxmlformats.org/package/2006/metadata/core-properties"/>
-    <ds:schemaRef ds:uri="http://purl.org/dc/elements/1.1/"/>
-    <ds:schemaRef ds:uri="http://purl.org/dc/terms/"/>
-    <ds:schemaRef ds:uri="http://schemas.microsoft.com/office/internal/2005/internalDocumentation"/>
+    <ds:schemaRef ds:uri="http://schemas.microsoft.com/sharepoint/v3/contenttype/forms"/>
   </ds:schemaRefs>
 </ds:datastoreItem>
 </file>
</xml_diff>

<commit_message>
Added BSSw.io BoF in ECP CBD to related events
</commit_message>
<xml_diff>
--- a/summary-testing.pptx
+++ b/summary-testing.pptx
@@ -263,7 +263,7 @@
           <a:p>
             <a:fld id="{0B842F42-2CE9-4E35-95C1-410DC08A50B1}" type="datetimeFigureOut">
               <a:rPr lang="en-US" smtClean="0"/>
-              <a:t>4/28/2022</a:t>
+              <a:t>4/30/2022</a:t>
             </a:fld>
             <a:endParaRPr lang="en-US"/>
           </a:p>
@@ -428,7 +428,7 @@
           <a:p>
             <a:fld id="{6F282904-F315-4730-8D91-37D99E141A6F}" type="datetimeFigureOut">
               <a:rPr lang="en-US" smtClean="0"/>
-              <a:t>4/28/2022</a:t>
+              <a:t>4/30/2022</a:t>
             </a:fld>
             <a:endParaRPr lang="en-US"/>
           </a:p>
@@ -6757,7 +6757,7 @@
                   <a:srgbClr val="333333"/>
                 </a:solidFill>
                 <a:effectLst/>
-                <a:latin typeface="Helvetica Neue"/>
+                <a:latin typeface="+mn-lt"/>
               </a:rPr>
               <a:t>IDEAS Desk – informal conversations about developer productivity and software sustainability</a:t>
             </a:r>
@@ -6773,7 +6773,7 @@
                 <a:solidFill>
                   <a:srgbClr val="333333"/>
                 </a:solidFill>
-                <a:latin typeface="Helvetica Neue"/>
+                <a:latin typeface="+mn-lt"/>
               </a:rPr>
               <a:t>Room 125 </a:t>
             </a:r>
@@ -6782,7 +6782,7 @@
                 <a:solidFill>
                   <a:srgbClr val="333333"/>
                 </a:solidFill>
-                <a:latin typeface="Helvetica Neue"/>
+                <a:latin typeface="+mn-lt"/>
               </a:rPr>
               <a:t>in the </a:t>
             </a:r>
@@ -6791,7 +6791,7 @@
                 <a:solidFill>
                   <a:srgbClr val="333333"/>
                 </a:solidFill>
-                <a:latin typeface="Helvetica Neue"/>
+                <a:latin typeface="+mn-lt"/>
                 <a:hlinkClick r:id="rId2"/>
               </a:rPr>
               <a:t>Gather.Town</a:t>
@@ -6801,7 +6801,7 @@
                 <a:solidFill>
                   <a:srgbClr val="333333"/>
                 </a:solidFill>
-                <a:latin typeface="Helvetica Neue"/>
+                <a:latin typeface="+mn-lt"/>
               </a:rPr>
               <a:t> Side Meetings area (</a:t>
             </a:r>
@@ -6810,7 +6810,7 @@
                 <a:solidFill>
                   <a:srgbClr val="333333"/>
                 </a:solidFill>
-                <a:latin typeface="Helvetica Neue"/>
+                <a:latin typeface="+mn-lt"/>
               </a:rPr>
               <a:t>Whova</a:t>
             </a:r>
@@ -6819,7 +6819,7 @@
                 <a:solidFill>
                   <a:srgbClr val="333333"/>
                 </a:solidFill>
-                <a:latin typeface="Helvetica Neue"/>
+                <a:latin typeface="+mn-lt"/>
               </a:rPr>
               <a:t> -&gt; Logistics)</a:t>
             </a:r>
@@ -6828,7 +6828,7 @@
                 <a:srgbClr val="333333"/>
               </a:solidFill>
               <a:effectLst/>
-              <a:latin typeface="Helvetica Neue"/>
+              <a:latin typeface="+mn-lt"/>
             </a:endParaRPr>
           </a:p>
           <a:p>
@@ -6842,7 +6842,7 @@
                 <a:solidFill>
                   <a:srgbClr val="333333"/>
                 </a:solidFill>
-                <a:latin typeface="Helvetica Neue"/>
+                <a:latin typeface="+mn-lt"/>
               </a:rPr>
               <a:t>Hours: 12:30pm-1:30pm Monday through Friday</a:t>
             </a:r>
@@ -6851,7 +6851,7 @@
                 <a:srgbClr val="333333"/>
               </a:solidFill>
               <a:effectLst/>
-              <a:latin typeface="Helvetica Neue"/>
+              <a:latin typeface="+mn-lt"/>
             </a:endParaRPr>
           </a:p>
           <a:p>
@@ -6861,7 +6861,7 @@
                   <a:srgbClr val="333333"/>
                 </a:solidFill>
                 <a:effectLst/>
-                <a:latin typeface="Helvetica Neue"/>
+                <a:latin typeface="+mn-lt"/>
                 <a:hlinkClick r:id="rId3"/>
               </a:rPr>
               <a:t>ECP Broader Engagement Initiative</a:t>
@@ -6871,7 +6871,7 @@
                 <a:srgbClr val="333333"/>
               </a:solidFill>
               <a:effectLst/>
-              <a:latin typeface="Helvetica Neue"/>
+              <a:latin typeface="+mn-lt"/>
             </a:endParaRPr>
           </a:p>
           <a:p>
@@ -6885,37 +6885,27 @@
                 <a:solidFill>
                   <a:srgbClr val="333333"/>
                 </a:solidFill>
-                <a:latin typeface="Helvetica Neue"/>
+                <a:latin typeface="+mn-lt"/>
               </a:rPr>
               <a:t>1:00pm-3:00pm Tuesday</a:t>
             </a:r>
           </a:p>
           <a:p>
             <a:r>
-              <a:rPr lang="en-US" sz="2000">
+              <a:rPr lang="en-US" sz="2000" dirty="0">
                 <a:solidFill>
                   <a:srgbClr val="333333"/>
                 </a:solidFill>
-                <a:latin typeface="Helvetica Neue"/>
+                <a:latin typeface="+mn-lt"/>
                 <a:hlinkClick r:id="rId4"/>
               </a:rPr>
-              <a:t>AD</a:t>
-            </a:r>
-            <a:r>
-              <a:rPr lang="en-US" sz="2000" dirty="0">
-                <a:solidFill>
-                  <a:srgbClr val="333333"/>
-                </a:solidFill>
-                <a:latin typeface="Helvetica Neue"/>
-                <a:hlinkClick r:id="rId4"/>
-              </a:rPr>
-              <a:t>, Hardware and Integration, and Facilities Poster Session</a:t>
+              <a:t>AD, Hardware and Integration, and Facilities Poster Session</a:t>
             </a:r>
             <a:endParaRPr lang="en-US" sz="2000" dirty="0">
               <a:solidFill>
                 <a:srgbClr val="333333"/>
               </a:solidFill>
-              <a:latin typeface="Helvetica Neue"/>
+              <a:latin typeface="+mn-lt"/>
             </a:endParaRPr>
           </a:p>
           <a:p>
@@ -6929,7 +6919,7 @@
                 <a:solidFill>
                   <a:srgbClr val="333333"/>
                 </a:solidFill>
-                <a:latin typeface="Helvetica Neue"/>
+                <a:latin typeface="+mn-lt"/>
               </a:rPr>
               <a:t>4:00pm-6:00pm Tuesday</a:t>
             </a:r>
@@ -6940,7 +6930,7 @@
                 <a:solidFill>
                   <a:srgbClr val="333333"/>
                 </a:solidFill>
-                <a:latin typeface="Helvetica Neue"/>
+                <a:latin typeface="+mn-lt"/>
                 <a:hlinkClick r:id="rId5"/>
               </a:rPr>
               <a:t>Best Practices #</a:t>
@@ -6950,7 +6940,7 @@
                 <a:solidFill>
                   <a:srgbClr val="333333"/>
                 </a:solidFill>
-                <a:latin typeface="Helvetica Neue"/>
+                <a:latin typeface="+mn-lt"/>
                 <a:hlinkClick r:id="rId5"/>
               </a:rPr>
               <a:t>somycodewillseethefuture</a:t>
@@ -6960,7 +6950,7 @@
                 <a:solidFill>
                   <a:srgbClr val="333333"/>
                 </a:solidFill>
-                <a:latin typeface="Helvetica Neue"/>
+                <a:latin typeface="+mn-lt"/>
                 <a:hlinkClick r:id="rId5"/>
               </a:rPr>
               <a:t> Breakout</a:t>
@@ -6969,7 +6959,7 @@
               <a:solidFill>
                 <a:srgbClr val="333333"/>
               </a:solidFill>
-              <a:latin typeface="Helvetica Neue"/>
+              <a:latin typeface="+mn-lt"/>
             </a:endParaRPr>
           </a:p>
           <a:p>
@@ -6983,7 +6973,7 @@
                 <a:solidFill>
                   <a:srgbClr val="333333"/>
                 </a:solidFill>
-                <a:latin typeface="Helvetica Neue"/>
+                <a:latin typeface="+mn-lt"/>
               </a:rPr>
               <a:t>1:00pm-2:00pm Wednesday</a:t>
             </a:r>
@@ -6994,7 +6984,7 @@
                 <a:solidFill>
                   <a:srgbClr val="333333"/>
                 </a:solidFill>
-                <a:latin typeface="Helvetica Neue"/>
+                <a:latin typeface="+mn-lt"/>
                 <a:hlinkClick r:id="rId6"/>
               </a:rPr>
               <a:t>Panel on Sustainability of ECP Software and Applications</a:t>
@@ -7003,7 +6993,7 @@
               <a:solidFill>
                 <a:srgbClr val="333333"/>
               </a:solidFill>
-              <a:latin typeface="Helvetica Neue"/>
+              <a:latin typeface="+mn-lt"/>
             </a:endParaRPr>
           </a:p>
           <a:p>
@@ -7017,7 +7007,7 @@
                 <a:solidFill>
                   <a:srgbClr val="333333"/>
                 </a:solidFill>
-                <a:latin typeface="Helvetica Neue"/>
+                <a:latin typeface="+mn-lt"/>
               </a:rPr>
               <a:t>1:00pm-3:00pm Wednesday</a:t>
             </a:r>
@@ -7028,7 +7018,7 @@
                 <a:solidFill>
                   <a:srgbClr val="333333"/>
                 </a:solidFill>
-                <a:latin typeface="Helvetica Neue"/>
+                <a:latin typeface="+mn-lt"/>
                 <a:hlinkClick r:id="rId7"/>
               </a:rPr>
               <a:t>What Can be Learned from Applying Team of Teams Principles to the ECP Projects </a:t>
@@ -7038,7 +7028,7 @@
                 <a:solidFill>
                   <a:srgbClr val="333333"/>
                 </a:solidFill>
-                <a:latin typeface="Helvetica Neue"/>
+                <a:latin typeface="+mn-lt"/>
                 <a:hlinkClick r:id="rId7"/>
               </a:rPr>
               <a:t>PETSc</a:t>
@@ -7048,7 +7038,7 @@
                 <a:solidFill>
                   <a:srgbClr val="333333"/>
                 </a:solidFill>
-                <a:latin typeface="Helvetica Neue"/>
+                <a:latin typeface="+mn-lt"/>
                 <a:hlinkClick r:id="rId7"/>
               </a:rPr>
               <a:t>, </a:t>
@@ -7058,7 +7048,7 @@
                 <a:solidFill>
                   <a:srgbClr val="333333"/>
                 </a:solidFill>
-                <a:latin typeface="Helvetica Neue"/>
+                <a:latin typeface="+mn-lt"/>
                 <a:hlinkClick r:id="rId7"/>
               </a:rPr>
               <a:t>Trilinos</a:t>
@@ -7068,7 +7058,7 @@
                 <a:solidFill>
                   <a:srgbClr val="333333"/>
                 </a:solidFill>
-                <a:latin typeface="Helvetica Neue"/>
+                <a:latin typeface="+mn-lt"/>
                 <a:hlinkClick r:id="rId7"/>
               </a:rPr>
               <a:t>, </a:t>
@@ -7078,7 +7068,7 @@
                 <a:solidFill>
                   <a:srgbClr val="333333"/>
                 </a:solidFill>
-                <a:latin typeface="Helvetica Neue"/>
+                <a:latin typeface="+mn-lt"/>
                 <a:hlinkClick r:id="rId7"/>
               </a:rPr>
               <a:t>xSDK</a:t>
@@ -7088,7 +7078,7 @@
                 <a:solidFill>
                   <a:srgbClr val="333333"/>
                 </a:solidFill>
-                <a:latin typeface="Helvetica Neue"/>
+                <a:latin typeface="+mn-lt"/>
                 <a:hlinkClick r:id="rId7"/>
               </a:rPr>
               <a:t>, and E4S?</a:t>
@@ -7097,7 +7087,7 @@
               <a:solidFill>
                 <a:srgbClr val="333333"/>
               </a:solidFill>
-              <a:latin typeface="Helvetica Neue"/>
+              <a:latin typeface="+mn-lt"/>
             </a:endParaRPr>
           </a:p>
           <a:p>
@@ -7111,9 +7101,89 @@
                 <a:solidFill>
                   <a:srgbClr val="333333"/>
                 </a:solidFill>
-                <a:latin typeface="Helvetica Neue"/>
+                <a:latin typeface="+mn-lt"/>
               </a:rPr>
               <a:t>1:00pm-3:00pm Thursday</a:t>
+            </a:r>
+          </a:p>
+          <a:p>
+            <a:pPr>
+              <a:spcBef>
+                <a:spcPts val="200"/>
+              </a:spcBef>
+            </a:pPr>
+            <a:r>
+              <a:rPr lang="en-US" sz="2000" b="1" dirty="0">
+                <a:solidFill>
+                  <a:srgbClr val="333333"/>
+                </a:solidFill>
+                <a:latin typeface="+mn-lt"/>
+              </a:rPr>
+              <a:t>Bonus</a:t>
+            </a:r>
+            <a:r>
+              <a:rPr lang="en-US" sz="2000" dirty="0">
+                <a:solidFill>
+                  <a:srgbClr val="333333"/>
+                </a:solidFill>
+                <a:latin typeface="+mn-lt"/>
+              </a:rPr>
+              <a:t>: </a:t>
+            </a:r>
+            <a:r>
+              <a:rPr lang="en-US" sz="2000" dirty="0">
+                <a:solidFill>
+                  <a:srgbClr val="333333"/>
+                </a:solidFill>
+                <a:latin typeface="+mn-lt"/>
+                <a:hlinkClick r:id="rId8"/>
+              </a:rPr>
+              <a:t>ECP Community </a:t>
+            </a:r>
+            <a:r>
+              <a:rPr lang="en-US" sz="2000" dirty="0" err="1">
+                <a:solidFill>
+                  <a:srgbClr val="333333"/>
+                </a:solidFill>
+                <a:latin typeface="+mn-lt"/>
+                <a:hlinkClick r:id="rId8"/>
+              </a:rPr>
+              <a:t>BoF</a:t>
+            </a:r>
+            <a:r>
+              <a:rPr lang="en-US" sz="2000" dirty="0">
+                <a:solidFill>
+                  <a:srgbClr val="333333"/>
+                </a:solidFill>
+                <a:latin typeface="+mn-lt"/>
+                <a:hlinkClick r:id="rId8"/>
+              </a:rPr>
+              <a:t> Days</a:t>
+            </a:r>
+            <a:r>
+              <a:rPr lang="en-US" sz="2000" dirty="0">
+                <a:solidFill>
+                  <a:srgbClr val="333333"/>
+                </a:solidFill>
+                <a:latin typeface="+mn-lt"/>
+              </a:rPr>
+              <a:t>: Fostering Software Sustainability, Productivity and Quality through BSSw.io (registration required)</a:t>
+            </a:r>
+          </a:p>
+          <a:p>
+            <a:pPr lvl="1">
+              <a:spcBef>
+                <a:spcPts val="200"/>
+              </a:spcBef>
+            </a:pPr>
+            <a:r>
+              <a:rPr lang="en-US" sz="1800" dirty="0">
+                <a:solidFill>
+                  <a:srgbClr val="333333"/>
+                </a:solidFill>
+                <a:latin typeface="+mn-lt"/>
+              </a:rPr>
+              <a:t>3:00pm-4:30pm Wednesday 11 May</a:t>
             </a:r>
           </a:p>
         </p:txBody>
@@ -8044,6 +8114,21 @@
 </file>
 
 <file path=customXml/item1.xml><?xml version="1.0" encoding="utf-8"?>
+<?mso-contentType ?>
+<FormTemplates xmlns="http://schemas.microsoft.com/sharepoint/v3/contenttype/forms">
+  <Display>DocumentLibraryForm</Display>
+  <Edit>DocumentLibraryForm</Edit>
+  <New>DocumentLibraryForm</New>
+</FormTemplates>
+</file>
+
+<file path=customXml/item2.xml><?xml version="1.0" encoding="utf-8"?>
+<p:properties xmlns:p="http://schemas.microsoft.com/office/2006/metadata/properties" xmlns:xsi="http://www.w3.org/2001/XMLSchema-instance" xmlns:pc="http://schemas.microsoft.com/office/infopath/2007/PartnerControls">
+  <documentManagement/>
+</p:properties>
+</file>
+
+<file path=customXml/item3.xml><?xml version="1.0" encoding="utf-8"?>
 <ct:contentTypeSchema xmlns:ct="http://schemas.microsoft.com/office/2006/metadata/contentType" xmlns:ma="http://schemas.microsoft.com/office/2006/metadata/properties/metaAttributes" ct:_="" ma:_="" ma:contentTypeName="Document" ma:contentTypeID="0x010100565464437F680748A68B85EB6594EA7D" ma:contentTypeVersion="0" ma:contentTypeDescription="Create a new document." ma:contentTypeScope="" ma:versionID="fe3f4dd58d5914c51cfc6deaa8ad845c">
   <xsd:schema xmlns:xsd="http://www.w3.org/2001/XMLSchema" xmlns:p="http://schemas.microsoft.com/office/2006/metadata/properties" targetNamespace="http://schemas.microsoft.com/office/2006/metadata/properties" ma:root="true" ma:fieldsID="4aeb20c0e3442673af7ee10786458764">
     <xsd:element name="properties">
@@ -8092,32 +8177,10 @@
 </ct:contentTypeSchema>
 </file>
 
-<file path=customXml/item2.xml><?xml version="1.0" encoding="utf-8"?>
-<p:properties xmlns:p="http://schemas.microsoft.com/office/2006/metadata/properties" xmlns:xsi="http://www.w3.org/2001/XMLSchema-instance" xmlns:pc="http://schemas.microsoft.com/office/infopath/2007/PartnerControls">
-  <documentManagement/>
-</p:properties>
-</file>
-
-<file path=customXml/item3.xml><?xml version="1.0" encoding="utf-8"?>
-<?mso-contentType ?>
-<FormTemplates xmlns="http://schemas.microsoft.com/sharepoint/v3/contenttype/forms">
-  <Display>DocumentLibraryForm</Display>
-  <Edit>DocumentLibraryForm</Edit>
-  <New>DocumentLibraryForm</New>
-</FormTemplates>
-</file>
-
 <file path=customXml/itemProps1.xml><?xml version="1.0" encoding="utf-8"?>
-<ds:datastoreItem xmlns:ds="http://schemas.openxmlformats.org/officeDocument/2006/customXml" ds:itemID="{E8DB7DEB-074E-4EE8-9B6E-FD277323109C}">
+<ds:datastoreItem xmlns:ds="http://schemas.openxmlformats.org/officeDocument/2006/customXml" ds:itemID="{19E20559-B232-4371-8690-E3D8007EDB82}">
   <ds:schemaRefs>
-    <ds:schemaRef ds:uri="http://schemas.microsoft.com/office/2006/metadata/contentType"/>
-    <ds:schemaRef ds:uri="http://schemas.microsoft.com/office/2006/metadata/properties/metaAttributes"/>
-    <ds:schemaRef ds:uri="http://www.w3.org/2001/XMLSchema"/>
-    <ds:schemaRef ds:uri="http://schemas.microsoft.com/office/2006/metadata/properties"/>
-    <ds:schemaRef ds:uri="http://schemas.openxmlformats.org/package/2006/metadata/core-properties"/>
-    <ds:schemaRef ds:uri="http://purl.org/dc/elements/1.1/"/>
-    <ds:schemaRef ds:uri="http://purl.org/dc/terms/"/>
-    <ds:schemaRef ds:uri="http://schemas.microsoft.com/office/internal/2005/internalDocumentation"/>
+    <ds:schemaRef ds:uri="http://schemas.microsoft.com/sharepoint/v3/contenttype/forms"/>
   </ds:schemaRefs>
 </ds:datastoreItem>
 </file>
@@ -8138,9 +8201,16 @@
 </file>
 
 <file path=customXml/itemProps3.xml><?xml version="1.0" encoding="utf-8"?>
-<ds:datastoreItem xmlns:ds="http://schemas.openxmlformats.org/officeDocument/2006/customXml" ds:itemID="{19E20559-B232-4371-8690-E3D8007EDB82}">
+<ds:datastoreItem xmlns:ds="http://schemas.openxmlformats.org/officeDocument/2006/customXml" ds:itemID="{E8DB7DEB-074E-4EE8-9B6E-FD277323109C}">
   <ds:schemaRefs>
-    <ds:schemaRef ds:uri="http://schemas.microsoft.com/sharepoint/v3/contenttype/forms"/>
+    <ds:schemaRef ds:uri="http://schemas.microsoft.com/office/2006/metadata/contentType"/>
+    <ds:schemaRef ds:uri="http://schemas.microsoft.com/office/2006/metadata/properties/metaAttributes"/>
+    <ds:schemaRef ds:uri="http://www.w3.org/2001/XMLSchema"/>
+    <ds:schemaRef ds:uri="http://schemas.microsoft.com/office/2006/metadata/properties"/>
+    <ds:schemaRef ds:uri="http://schemas.openxmlformats.org/package/2006/metadata/core-properties"/>
+    <ds:schemaRef ds:uri="http://purl.org/dc/elements/1.1/"/>
+    <ds:schemaRef ds:uri="http://purl.org/dc/terms/"/>
+    <ds:schemaRef ds:uri="http://schemas.microsoft.com/office/internal/2005/internalDocumentation"/>
   </ds:schemaRefs>
 </ds:datastoreItem>
 </file>
</xml_diff>